<commit_message>
premiere modification pour valider
</commit_message>
<xml_diff>
--- a/Présentation PowerPoint.pptx
+++ b/Présentation PowerPoint.pptx
@@ -114,6 +114,11 @@
       </a:defRPr>
     </a:lvl9pPr>
   </p:defaultTextStyle>
+  <p:extLst>
+    <p:ext uri="{EFAFB233-063F-42B5-8137-9DF3F51BA10A}">
+      <p15:sldGuideLst xmlns:p15="http://schemas.microsoft.com/office/powerpoint/2012/main"/>
+    </p:ext>
+  </p:extLst>
 </p:presentation>
 </file>
 
@@ -5520,7 +5525,7 @@
           <a:p>
             <a:fld id="{05B5C82D-1940-43E4-80D6-B5A1D21ED4D5}" type="datetimeFigureOut">
               <a:rPr lang="fr-FR" smtClean="0"/>
-              <a:t>16/05/2019</a:t>
+              <a:t>23/05/2019</a:t>
             </a:fld>
             <a:endParaRPr lang="fr-FR"/>
           </a:p>
@@ -6210,7 +6215,7 @@
           <a:p>
             <a:fld id="{52209DFD-A00E-4F63-9074-0C2290EA5EC2}" type="datetimeFigureOut">
               <a:rPr lang="fr-FR" smtClean="0"/>
-              <a:t>15/05/2019</a:t>
+              <a:t>23/05/2019</a:t>
             </a:fld>
             <a:endParaRPr lang="fr-FR"/>
           </a:p>
@@ -6522,7 +6527,7 @@
           <a:p>
             <a:fld id="{52209DFD-A00E-4F63-9074-0C2290EA5EC2}" type="datetimeFigureOut">
               <a:rPr lang="fr-FR" smtClean="0"/>
-              <a:t>15/05/2019</a:t>
+              <a:t>23/05/2019</a:t>
             </a:fld>
             <a:endParaRPr lang="fr-FR"/>
           </a:p>
@@ -6744,7 +6749,7 @@
           <a:p>
             <a:fld id="{52209DFD-A00E-4F63-9074-0C2290EA5EC2}" type="datetimeFigureOut">
               <a:rPr lang="fr-FR" smtClean="0"/>
-              <a:t>15/05/2019</a:t>
+              <a:t>23/05/2019</a:t>
             </a:fld>
             <a:endParaRPr lang="fr-FR"/>
           </a:p>
@@ -7035,7 +7040,7 @@
           <a:p>
             <a:fld id="{52209DFD-A00E-4F63-9074-0C2290EA5EC2}" type="datetimeFigureOut">
               <a:rPr lang="fr-FR" smtClean="0"/>
-              <a:t>15/05/2019</a:t>
+              <a:t>23/05/2019</a:t>
             </a:fld>
             <a:endParaRPr lang="fr-FR"/>
           </a:p>
@@ -7489,7 +7494,7 @@
           <a:p>
             <a:fld id="{52209DFD-A00E-4F63-9074-0C2290EA5EC2}" type="datetimeFigureOut">
               <a:rPr lang="fr-FR" smtClean="0"/>
-              <a:t>15/05/2019</a:t>
+              <a:t>23/05/2019</a:t>
             </a:fld>
             <a:endParaRPr lang="fr-FR"/>
           </a:p>
@@ -8065,7 +8070,7 @@
           <a:p>
             <a:fld id="{52209DFD-A00E-4F63-9074-0C2290EA5EC2}" type="datetimeFigureOut">
               <a:rPr lang="fr-FR" smtClean="0"/>
-              <a:t>15/05/2019</a:t>
+              <a:t>23/05/2019</a:t>
             </a:fld>
             <a:endParaRPr lang="fr-FR"/>
           </a:p>
@@ -8917,7 +8922,7 @@
           <a:p>
             <a:fld id="{52209DFD-A00E-4F63-9074-0C2290EA5EC2}" type="datetimeFigureOut">
               <a:rPr lang="fr-FR" smtClean="0"/>
-              <a:t>15/05/2019</a:t>
+              <a:t>23/05/2019</a:t>
             </a:fld>
             <a:endParaRPr lang="fr-FR"/>
           </a:p>
@@ -9122,7 +9127,7 @@
           <a:p>
             <a:fld id="{52209DFD-A00E-4F63-9074-0C2290EA5EC2}" type="datetimeFigureOut">
               <a:rPr lang="fr-FR" smtClean="0"/>
-              <a:t>15/05/2019</a:t>
+              <a:t>23/05/2019</a:t>
             </a:fld>
             <a:endParaRPr lang="fr-FR"/>
           </a:p>
@@ -9336,7 +9341,7 @@
           <a:p>
             <a:fld id="{52209DFD-A00E-4F63-9074-0C2290EA5EC2}" type="datetimeFigureOut">
               <a:rPr lang="fr-FR" smtClean="0"/>
-              <a:t>15/05/2019</a:t>
+              <a:t>23/05/2019</a:t>
             </a:fld>
             <a:endParaRPr lang="fr-FR"/>
           </a:p>
@@ -9506,7 +9511,7 @@
           <a:p>
             <a:fld id="{52209DFD-A00E-4F63-9074-0C2290EA5EC2}" type="datetimeFigureOut">
               <a:rPr lang="fr-FR" smtClean="0"/>
-              <a:t>15/05/2019</a:t>
+              <a:t>23/05/2019</a:t>
             </a:fld>
             <a:endParaRPr lang="fr-FR"/>
           </a:p>
@@ -9711,7 +9716,7 @@
           <a:p>
             <a:fld id="{52209DFD-A00E-4F63-9074-0C2290EA5EC2}" type="datetimeFigureOut">
               <a:rPr lang="fr-FR" smtClean="0"/>
-              <a:t>15/05/2019</a:t>
+              <a:t>23/05/2019</a:t>
             </a:fld>
             <a:endParaRPr lang="fr-FR"/>
           </a:p>
@@ -9991,7 +9996,7 @@
           <a:p>
             <a:fld id="{52209DFD-A00E-4F63-9074-0C2290EA5EC2}" type="datetimeFigureOut">
               <a:rPr lang="fr-FR" smtClean="0"/>
-              <a:t>15/05/2019</a:t>
+              <a:t>23/05/2019</a:t>
             </a:fld>
             <a:endParaRPr lang="fr-FR"/>
           </a:p>
@@ -10258,7 +10263,7 @@
           <a:p>
             <a:fld id="{52209DFD-A00E-4F63-9074-0C2290EA5EC2}" type="datetimeFigureOut">
               <a:rPr lang="fr-FR" smtClean="0"/>
-              <a:t>15/05/2019</a:t>
+              <a:t>23/05/2019</a:t>
             </a:fld>
             <a:endParaRPr lang="fr-FR"/>
           </a:p>
@@ -10673,7 +10678,7 @@
           <a:p>
             <a:fld id="{52209DFD-A00E-4F63-9074-0C2290EA5EC2}" type="datetimeFigureOut">
               <a:rPr lang="fr-FR" smtClean="0"/>
-              <a:t>15/05/2019</a:t>
+              <a:t>23/05/2019</a:t>
             </a:fld>
             <a:endParaRPr lang="fr-FR"/>
           </a:p>
@@ -10821,7 +10826,7 @@
           <a:p>
             <a:fld id="{52209DFD-A00E-4F63-9074-0C2290EA5EC2}" type="datetimeFigureOut">
               <a:rPr lang="fr-FR" smtClean="0"/>
-              <a:t>15/05/2019</a:t>
+              <a:t>23/05/2019</a:t>
             </a:fld>
             <a:endParaRPr lang="fr-FR"/>
           </a:p>
@@ -10946,7 +10951,7 @@
           <a:p>
             <a:fld id="{52209DFD-A00E-4F63-9074-0C2290EA5EC2}" type="datetimeFigureOut">
               <a:rPr lang="fr-FR" smtClean="0"/>
-              <a:t>15/05/2019</a:t>
+              <a:t>23/05/2019</a:t>
             </a:fld>
             <a:endParaRPr lang="fr-FR"/>
           </a:p>
@@ -11225,7 +11230,7 @@
           <a:p>
             <a:fld id="{52209DFD-A00E-4F63-9074-0C2290EA5EC2}" type="datetimeFigureOut">
               <a:rPr lang="fr-FR" smtClean="0"/>
-              <a:t>15/05/2019</a:t>
+              <a:t>23/05/2019</a:t>
             </a:fld>
             <a:endParaRPr lang="fr-FR"/>
           </a:p>
@@ -11537,7 +11542,7 @@
           <a:p>
             <a:fld id="{52209DFD-A00E-4F63-9074-0C2290EA5EC2}" type="datetimeFigureOut">
               <a:rPr lang="fr-FR" smtClean="0"/>
-              <a:t>15/05/2019</a:t>
+              <a:t>23/05/2019</a:t>
             </a:fld>
             <a:endParaRPr lang="fr-FR"/>
           </a:p>
@@ -11790,7 +11795,7 @@
           <a:p>
             <a:fld id="{52209DFD-A00E-4F63-9074-0C2290EA5EC2}" type="datetimeFigureOut">
               <a:rPr lang="fr-FR" smtClean="0"/>
-              <a:t>15/05/2019</a:t>
+              <a:t>23/05/2019</a:t>
             </a:fld>
             <a:endParaRPr lang="fr-FR"/>
           </a:p>
@@ -12401,13 +12406,13 @@
   <p:clrMapOvr>
     <a:masterClrMapping/>
   </p:clrMapOvr>
-  <mc:AlternateContent xmlns:mc="http://schemas.openxmlformats.org/markup-compatibility/2006">
-    <mc:Choice xmlns:p14="http://schemas.microsoft.com/office/powerpoint/2010/main" Requires="p14">
+  <mc:AlternateContent xmlns:mc="http://schemas.openxmlformats.org/markup-compatibility/2006" xmlns:p14="http://schemas.microsoft.com/office/powerpoint/2010/main">
+    <mc:Choice Requires="p14">
       <p:transition spd="slow" p14:dur="1200">
         <p14:prism/>
       </p:transition>
     </mc:Choice>
-    <mc:Fallback>
+    <mc:Fallback xmlns="">
       <p:transition spd="slow">
         <p:fade/>
       </p:transition>
@@ -12511,34 +12516,6 @@
           </a:graphicData>
         </a:graphic>
       </p:graphicFrame>
-      <p:sp>
-        <p:nvSpPr>
-          <p:cNvPr id="5" name="Espace réservé du texte 4">
-            <a:extLst>
-              <a:ext uri="{FF2B5EF4-FFF2-40B4-BE49-F238E27FC236}">
-                <a16:creationId xmlns:a16="http://schemas.microsoft.com/office/drawing/2014/main" id="{6F489A17-E5E2-469E-9F73-1FFAAE8722FC}"/>
-              </a:ext>
-            </a:extLst>
-          </p:cNvPr>
-          <p:cNvSpPr>
-            <a:spLocks noGrp="1"/>
-          </p:cNvSpPr>
-          <p:nvPr>
-            <p:ph type="body" idx="4294967295"/>
-          </p:nvPr>
-        </p:nvSpPr>
-        <p:spPr/>
-        <p:txBody>
-          <a:bodyPr/>
-          <a:lstStyle/>
-          <a:p>
-            <a:pPr marL="0" lvl="0" indent="0">
-              <a:buNone/>
-            </a:pPr>
-            <a:endParaRPr lang="fr-FR" dirty="0"/>
-          </a:p>
-        </p:txBody>
-      </p:sp>
     </p:spTree>
     <p:extLst>
       <p:ext uri="{BB962C8B-B14F-4D97-AF65-F5344CB8AC3E}">
@@ -12549,13 +12526,13 @@
   <p:clrMapOvr>
     <a:masterClrMapping/>
   </p:clrMapOvr>
-  <mc:AlternateContent xmlns:mc="http://schemas.openxmlformats.org/markup-compatibility/2006">
-    <mc:Choice xmlns:p14="http://schemas.microsoft.com/office/powerpoint/2010/main" Requires="p14">
+  <mc:AlternateContent xmlns:mc="http://schemas.openxmlformats.org/markup-compatibility/2006" xmlns:p14="http://schemas.microsoft.com/office/powerpoint/2010/main">
+    <mc:Choice Requires="p14">
       <p:transition spd="slow" p14:dur="1200">
         <p14:prism/>
       </p:transition>
     </mc:Choice>
-    <mc:Fallback>
+    <mc:Fallback xmlns="">
       <p:transition spd="slow">
         <p:fade/>
       </p:transition>
@@ -12661,13 +12638,13 @@
   <p:clrMapOvr>
     <a:masterClrMapping/>
   </p:clrMapOvr>
-  <mc:AlternateContent xmlns:mc="http://schemas.openxmlformats.org/markup-compatibility/2006">
-    <mc:Choice xmlns:p14="http://schemas.microsoft.com/office/powerpoint/2010/main" Requires="p14">
+  <mc:AlternateContent xmlns:mc="http://schemas.openxmlformats.org/markup-compatibility/2006" xmlns:p14="http://schemas.microsoft.com/office/powerpoint/2010/main">
+    <mc:Choice Requires="p14">
       <p:transition spd="slow" p14:dur="1200">
         <p14:prism/>
       </p:transition>
     </mc:Choice>
-    <mc:Fallback>
+    <mc:Fallback xmlns="">
       <p:transition spd="slow">
         <p:fade/>
       </p:transition>
@@ -12813,13 +12790,13 @@
   <p:clrMapOvr>
     <a:masterClrMapping/>
   </p:clrMapOvr>
-  <mc:AlternateContent xmlns:mc="http://schemas.openxmlformats.org/markup-compatibility/2006">
-    <mc:Choice xmlns:p14="http://schemas.microsoft.com/office/powerpoint/2010/main" Requires="p14">
+  <mc:AlternateContent xmlns:mc="http://schemas.openxmlformats.org/markup-compatibility/2006" xmlns:p14="http://schemas.microsoft.com/office/powerpoint/2010/main">
+    <mc:Choice Requires="p14">
       <p:transition spd="slow" p14:dur="1200">
         <p14:prism/>
       </p:transition>
     </mc:Choice>
-    <mc:Fallback>
+    <mc:Fallback xmlns="">
       <p:transition spd="slow">
         <p:fade/>
       </p:transition>
@@ -13146,13 +13123,13 @@
   <p:clrMapOvr>
     <a:masterClrMapping/>
   </p:clrMapOvr>
-  <mc:AlternateContent xmlns:mc="http://schemas.openxmlformats.org/markup-compatibility/2006">
-    <mc:Choice xmlns:p14="http://schemas.microsoft.com/office/powerpoint/2010/main" Requires="p14">
+  <mc:AlternateContent xmlns:mc="http://schemas.openxmlformats.org/markup-compatibility/2006" xmlns:p14="http://schemas.microsoft.com/office/powerpoint/2010/main">
+    <mc:Choice Requires="p14">
       <p:transition spd="slow" p14:dur="1600">
         <p:blinds dir="vert"/>
       </p:transition>
     </mc:Choice>
-    <mc:Fallback>
+    <mc:Fallback xmlns="">
       <p:transition spd="slow">
         <p:blinds dir="vert"/>
       </p:transition>
@@ -13489,13 +13466,13 @@
   <p:clrMapOvr>
     <a:masterClrMapping/>
   </p:clrMapOvr>
-  <mc:AlternateContent xmlns:mc="http://schemas.openxmlformats.org/markup-compatibility/2006">
-    <mc:Choice xmlns:p14="http://schemas.microsoft.com/office/powerpoint/2010/main" Requires="p14">
+  <mc:AlternateContent xmlns:mc="http://schemas.openxmlformats.org/markup-compatibility/2006" xmlns:p14="http://schemas.microsoft.com/office/powerpoint/2010/main">
+    <mc:Choice Requires="p14">
       <p:transition spd="slow" p14:dur="1600">
         <p:blinds dir="vert"/>
       </p:transition>
     </mc:Choice>
-    <mc:Fallback>
+    <mc:Fallback xmlns="">
       <p:transition spd="slow">
         <p:blinds dir="vert"/>
       </p:transition>
@@ -13712,13 +13689,13 @@
   <p:clrMapOvr>
     <a:masterClrMapping/>
   </p:clrMapOvr>
-  <mc:AlternateContent xmlns:mc="http://schemas.openxmlformats.org/markup-compatibility/2006">
-    <mc:Choice xmlns:p14="http://schemas.microsoft.com/office/powerpoint/2010/main" Requires="p14">
+  <mc:AlternateContent xmlns:mc="http://schemas.openxmlformats.org/markup-compatibility/2006" xmlns:p14="http://schemas.microsoft.com/office/powerpoint/2010/main">
+    <mc:Choice Requires="p14">
       <p:transition spd="slow" p14:dur="1200">
         <p14:prism/>
       </p:transition>
     </mc:Choice>
-    <mc:Fallback>
+    <mc:Fallback xmlns="">
       <p:transition spd="slow">
         <p:fade/>
       </p:transition>
@@ -13988,13 +13965,13 @@
   <p:clrMapOvr>
     <a:masterClrMapping/>
   </p:clrMapOvr>
-  <mc:AlternateContent xmlns:mc="http://schemas.openxmlformats.org/markup-compatibility/2006">
-    <mc:Choice xmlns:p14="http://schemas.microsoft.com/office/powerpoint/2010/main" Requires="p14">
+  <mc:AlternateContent xmlns:mc="http://schemas.openxmlformats.org/markup-compatibility/2006" xmlns:p14="http://schemas.microsoft.com/office/powerpoint/2010/main">
+    <mc:Choice Requires="p14">
       <p:transition spd="slow" p14:dur="1600">
         <p:blinds dir="vert"/>
       </p:transition>
     </mc:Choice>
-    <mc:Fallback>
+    <mc:Fallback xmlns="">
       <p:transition spd="slow">
         <p:blinds dir="vert"/>
       </p:transition>

</xml_diff>